<commit_message>
updated all files for V4.
</commit_message>
<xml_diff>
--- a/outputs/04_figure1.pptx
+++ b/outputs/04_figure1.pptx
@@ -208,7 +208,7 @@
           <a:p>
             <a:fld id="{9A9419D7-5924-49C0-9504-452E67C97870}" type="datetimeFigureOut">
               <a:rPr lang="fr-CA" smtClean="0"/>
-              <a:t>2021-03-25</a:t>
+              <a:t>2021-06-03</a:t>
             </a:fld>
             <a:endParaRPr lang="fr-CA"/>
           </a:p>
@@ -607,7 +607,7 @@
           <a:p>
             <a:fld id="{32A0699C-D3BC-484E-82D6-1FCA1F25489B}" type="datetimeFigureOut">
               <a:rPr lang="fr-CA" smtClean="0"/>
-              <a:t>2021-03-25</a:t>
+              <a:t>2021-06-03</a:t>
             </a:fld>
             <a:endParaRPr lang="fr-CA"/>
           </a:p>
@@ -777,7 +777,7 @@
           <a:p>
             <a:fld id="{32A0699C-D3BC-484E-82D6-1FCA1F25489B}" type="datetimeFigureOut">
               <a:rPr lang="fr-CA" smtClean="0"/>
-              <a:t>2021-03-25</a:t>
+              <a:t>2021-06-03</a:t>
             </a:fld>
             <a:endParaRPr lang="fr-CA"/>
           </a:p>
@@ -957,7 +957,7 @@
           <a:p>
             <a:fld id="{32A0699C-D3BC-484E-82D6-1FCA1F25489B}" type="datetimeFigureOut">
               <a:rPr lang="fr-CA" smtClean="0"/>
-              <a:t>2021-03-25</a:t>
+              <a:t>2021-06-03</a:t>
             </a:fld>
             <a:endParaRPr lang="fr-CA"/>
           </a:p>
@@ -1127,7 +1127,7 @@
           <a:p>
             <a:fld id="{32A0699C-D3BC-484E-82D6-1FCA1F25489B}" type="datetimeFigureOut">
               <a:rPr lang="fr-CA" smtClean="0"/>
-              <a:t>2021-03-25</a:t>
+              <a:t>2021-06-03</a:t>
             </a:fld>
             <a:endParaRPr lang="fr-CA"/>
           </a:p>
@@ -1373,7 +1373,7 @@
           <a:p>
             <a:fld id="{32A0699C-D3BC-484E-82D6-1FCA1F25489B}" type="datetimeFigureOut">
               <a:rPr lang="fr-CA" smtClean="0"/>
-              <a:t>2021-03-25</a:t>
+              <a:t>2021-06-03</a:t>
             </a:fld>
             <a:endParaRPr lang="fr-CA"/>
           </a:p>
@@ -1605,7 +1605,7 @@
           <a:p>
             <a:fld id="{32A0699C-D3BC-484E-82D6-1FCA1F25489B}" type="datetimeFigureOut">
               <a:rPr lang="fr-CA" smtClean="0"/>
-              <a:t>2021-03-25</a:t>
+              <a:t>2021-06-03</a:t>
             </a:fld>
             <a:endParaRPr lang="fr-CA"/>
           </a:p>
@@ -1972,7 +1972,7 @@
           <a:p>
             <a:fld id="{32A0699C-D3BC-484E-82D6-1FCA1F25489B}" type="datetimeFigureOut">
               <a:rPr lang="fr-CA" smtClean="0"/>
-              <a:t>2021-03-25</a:t>
+              <a:t>2021-06-03</a:t>
             </a:fld>
             <a:endParaRPr lang="fr-CA"/>
           </a:p>
@@ -2090,7 +2090,7 @@
           <a:p>
             <a:fld id="{32A0699C-D3BC-484E-82D6-1FCA1F25489B}" type="datetimeFigureOut">
               <a:rPr lang="fr-CA" smtClean="0"/>
-              <a:t>2021-03-25</a:t>
+              <a:t>2021-06-03</a:t>
             </a:fld>
             <a:endParaRPr lang="fr-CA"/>
           </a:p>
@@ -2185,7 +2185,7 @@
           <a:p>
             <a:fld id="{32A0699C-D3BC-484E-82D6-1FCA1F25489B}" type="datetimeFigureOut">
               <a:rPr lang="fr-CA" smtClean="0"/>
-              <a:t>2021-03-25</a:t>
+              <a:t>2021-06-03</a:t>
             </a:fld>
             <a:endParaRPr lang="fr-CA"/>
           </a:p>
@@ -2462,7 +2462,7 @@
           <a:p>
             <a:fld id="{32A0699C-D3BC-484E-82D6-1FCA1F25489B}" type="datetimeFigureOut">
               <a:rPr lang="fr-CA" smtClean="0"/>
-              <a:t>2021-03-25</a:t>
+              <a:t>2021-06-03</a:t>
             </a:fld>
             <a:endParaRPr lang="fr-CA"/>
           </a:p>
@@ -2715,7 +2715,7 @@
           <a:p>
             <a:fld id="{32A0699C-D3BC-484E-82D6-1FCA1F25489B}" type="datetimeFigureOut">
               <a:rPr lang="fr-CA" smtClean="0"/>
-              <a:t>2021-03-25</a:t>
+              <a:t>2021-06-03</a:t>
             </a:fld>
             <a:endParaRPr lang="fr-CA"/>
           </a:p>
@@ -2928,7 +2928,7 @@
           <a:p>
             <a:fld id="{32A0699C-D3BC-484E-82D6-1FCA1F25489B}" type="datetimeFigureOut">
               <a:rPr lang="fr-CA" smtClean="0"/>
-              <a:t>2021-03-25</a:t>
+              <a:t>2021-06-03</a:t>
             </a:fld>
             <a:endParaRPr lang="fr-CA"/>
           </a:p>
@@ -3476,7 +3476,17 @@
                       <a:latin typeface="Times New Roman" panose="02020603050405020304" pitchFamily="18" charset="0"/>
                       <a:cs typeface="Times New Roman" panose="02020603050405020304" pitchFamily="18" charset="0"/>
                     </a:rPr>
-                    <a:t>A)</a:t>
+                    <a:t>(A</a:t>
+                  </a:r>
+                  <a:r>
+                    <a:rPr lang="fr-CA" b="1" dirty="0" smtClean="0">
+                      <a:solidFill>
+                        <a:schemeClr val="bg1"/>
+                      </a:solidFill>
+                      <a:latin typeface="Times New Roman" panose="02020603050405020304" pitchFamily="18" charset="0"/>
+                      <a:cs typeface="Times New Roman" panose="02020603050405020304" pitchFamily="18" charset="0"/>
+                    </a:rPr>
+                    <a:t>)</a:t>
                   </a:r>
                   <a:endParaRPr lang="fr-CA" b="1" dirty="0">
                     <a:solidFill>
@@ -3511,14 +3521,14 @@
                 <a:lstStyle/>
                 <a:p>
                   <a:r>
-                    <a:rPr lang="fr-CA" b="1" dirty="0">
+                    <a:rPr lang="fr-CA" b="1" dirty="0" smtClean="0">
                       <a:solidFill>
                         <a:schemeClr val="bg1"/>
                       </a:solidFill>
                       <a:latin typeface="Times New Roman" panose="02020603050405020304" pitchFamily="18" charset="0"/>
                       <a:cs typeface="Times New Roman" panose="02020603050405020304" pitchFamily="18" charset="0"/>
                     </a:rPr>
-                    <a:t>B</a:t>
+                    <a:t>(B</a:t>
                   </a:r>
                   <a:r>
                     <a:rPr lang="fr-CA" b="1" dirty="0" smtClean="0">
@@ -3687,7 +3697,17 @@
                       <a:latin typeface="Times New Roman" panose="02020603050405020304" pitchFamily="18" charset="0"/>
                       <a:cs typeface="Times New Roman" panose="02020603050405020304" pitchFamily="18" charset="0"/>
                     </a:rPr>
-                    <a:t>D)</a:t>
+                    <a:t>(D</a:t>
+                  </a:r>
+                  <a:r>
+                    <a:rPr lang="fr-CA" b="1" dirty="0" smtClean="0">
+                      <a:solidFill>
+                        <a:schemeClr val="bg1"/>
+                      </a:solidFill>
+                      <a:latin typeface="Times New Roman" panose="02020603050405020304" pitchFamily="18" charset="0"/>
+                      <a:cs typeface="Times New Roman" panose="02020603050405020304" pitchFamily="18" charset="0"/>
+                    </a:rPr>
+                    <a:t>)</a:t>
                   </a:r>
                   <a:endParaRPr lang="fr-CA" b="1" dirty="0">
                     <a:solidFill>
@@ -3801,14 +3821,14 @@
                 <a:lstStyle/>
                 <a:p>
                   <a:r>
-                    <a:rPr lang="fr-CA" b="1" dirty="0">
+                    <a:rPr lang="fr-CA" b="1" dirty="0" smtClean="0">
                       <a:solidFill>
                         <a:schemeClr val="bg1"/>
                       </a:solidFill>
                       <a:latin typeface="Times New Roman" panose="02020603050405020304" pitchFamily="18" charset="0"/>
                       <a:cs typeface="Times New Roman" panose="02020603050405020304" pitchFamily="18" charset="0"/>
                     </a:rPr>
-                    <a:t>C</a:t>
+                    <a:t>(C</a:t>
                   </a:r>
                   <a:r>
                     <a:rPr lang="fr-CA" b="1" dirty="0" smtClean="0">

</xml_diff>